<commit_message>
Documentation update - new firmware.
</commit_message>
<xml_diff>
--- a/manuals/ls3-modes.pptx
+++ b/manuals/ls3-modes.pptx
@@ -288,7 +288,7 @@
           <a:p>
             <a:fld id="{DCA948F1-91BB-4B18-802C-61A17130F7D7}" type="datetimeFigureOut">
               <a:rPr lang="en-US" smtClean="0"/>
-              <a:t>5/15/2019</a:t>
+              <a:t>6/23/2019</a:t>
             </a:fld>
             <a:endParaRPr lang="en-US"/>
           </a:p>
@@ -458,7 +458,7 @@
           <a:p>
             <a:fld id="{DCA948F1-91BB-4B18-802C-61A17130F7D7}" type="datetimeFigureOut">
               <a:rPr lang="en-US" smtClean="0"/>
-              <a:t>5/15/2019</a:t>
+              <a:t>6/23/2019</a:t>
             </a:fld>
             <a:endParaRPr lang="en-US"/>
           </a:p>
@@ -638,7 +638,7 @@
           <a:p>
             <a:fld id="{DCA948F1-91BB-4B18-802C-61A17130F7D7}" type="datetimeFigureOut">
               <a:rPr lang="en-US" smtClean="0"/>
-              <a:t>5/15/2019</a:t>
+              <a:t>6/23/2019</a:t>
             </a:fld>
             <a:endParaRPr lang="en-US"/>
           </a:p>
@@ -808,7 +808,7 @@
           <a:p>
             <a:fld id="{DCA948F1-91BB-4B18-802C-61A17130F7D7}" type="datetimeFigureOut">
               <a:rPr lang="en-US" smtClean="0"/>
-              <a:t>5/15/2019</a:t>
+              <a:t>6/23/2019</a:t>
             </a:fld>
             <a:endParaRPr lang="en-US"/>
           </a:p>
@@ -1054,7 +1054,7 @@
           <a:p>
             <a:fld id="{DCA948F1-91BB-4B18-802C-61A17130F7D7}" type="datetimeFigureOut">
               <a:rPr lang="en-US" smtClean="0"/>
-              <a:t>5/15/2019</a:t>
+              <a:t>6/23/2019</a:t>
             </a:fld>
             <a:endParaRPr lang="en-US"/>
           </a:p>
@@ -1342,7 +1342,7 @@
           <a:p>
             <a:fld id="{DCA948F1-91BB-4B18-802C-61A17130F7D7}" type="datetimeFigureOut">
               <a:rPr lang="en-US" smtClean="0"/>
-              <a:t>5/15/2019</a:t>
+              <a:t>6/23/2019</a:t>
             </a:fld>
             <a:endParaRPr lang="en-US"/>
           </a:p>
@@ -1764,7 +1764,7 @@
           <a:p>
             <a:fld id="{DCA948F1-91BB-4B18-802C-61A17130F7D7}" type="datetimeFigureOut">
               <a:rPr lang="en-US" smtClean="0"/>
-              <a:t>5/15/2019</a:t>
+              <a:t>6/23/2019</a:t>
             </a:fld>
             <a:endParaRPr lang="en-US"/>
           </a:p>
@@ -1882,7 +1882,7 @@
           <a:p>
             <a:fld id="{DCA948F1-91BB-4B18-802C-61A17130F7D7}" type="datetimeFigureOut">
               <a:rPr lang="en-US" smtClean="0"/>
-              <a:t>5/15/2019</a:t>
+              <a:t>6/23/2019</a:t>
             </a:fld>
             <a:endParaRPr lang="en-US"/>
           </a:p>
@@ -1977,7 +1977,7 @@
           <a:p>
             <a:fld id="{DCA948F1-91BB-4B18-802C-61A17130F7D7}" type="datetimeFigureOut">
               <a:rPr lang="en-US" smtClean="0"/>
-              <a:t>5/15/2019</a:t>
+              <a:t>6/23/2019</a:t>
             </a:fld>
             <a:endParaRPr lang="en-US"/>
           </a:p>
@@ -2254,7 +2254,7 @@
           <a:p>
             <a:fld id="{DCA948F1-91BB-4B18-802C-61A17130F7D7}" type="datetimeFigureOut">
               <a:rPr lang="en-US" smtClean="0"/>
-              <a:t>5/15/2019</a:t>
+              <a:t>6/23/2019</a:t>
             </a:fld>
             <a:endParaRPr lang="en-US"/>
           </a:p>
@@ -2507,7 +2507,7 @@
           <a:p>
             <a:fld id="{DCA948F1-91BB-4B18-802C-61A17130F7D7}" type="datetimeFigureOut">
               <a:rPr lang="en-US" smtClean="0"/>
-              <a:t>5/15/2019</a:t>
+              <a:t>6/23/2019</a:t>
             </a:fld>
             <a:endParaRPr lang="en-US"/>
           </a:p>
@@ -2720,7 +2720,7 @@
           <a:p>
             <a:fld id="{DCA948F1-91BB-4B18-802C-61A17130F7D7}" type="datetimeFigureOut">
               <a:rPr lang="en-US" smtClean="0"/>
-              <a:t>5/15/2019</a:t>
+              <a:t>6/23/2019</a:t>
             </a:fld>
             <a:endParaRPr lang="en-US"/>
           </a:p>
@@ -3977,7 +3977,7 @@
         </p:nvSpPr>
         <p:spPr>
           <a:xfrm>
-            <a:off x="3347715" y="5617199"/>
+            <a:off x="3503834" y="5171437"/>
             <a:ext cx="564578" cy="369332"/>
           </a:xfrm>
           <a:prstGeom prst="rect">
@@ -4150,7 +4150,7 @@
         <p:spPr>
           <a:xfrm>
             <a:off x="6721088" y="3769568"/>
-            <a:ext cx="1951432" cy="646331"/>
+            <a:ext cx="2035750" cy="646331"/>
           </a:xfrm>
           <a:prstGeom prst="rect">
             <a:avLst/>
@@ -4165,8 +4165,13 @@
           <a:p>
             <a:r>
               <a:rPr lang="de-DE" dirty="0" smtClean="0"/>
-              <a:t>End of mode</a:t>
-            </a:r>
+              <a:t>End of </a:t>
+            </a:r>
+            <a:r>
+              <a:rPr lang="de-DE" dirty="0" smtClean="0"/>
+              <a:t>mode / EOM</a:t>
+            </a:r>
+            <a:endParaRPr lang="de-DE" dirty="0" smtClean="0"/>
           </a:p>
           <a:p>
             <a:r>
@@ -4408,7 +4413,7 @@
         <p:spPr>
           <a:xfrm>
             <a:off x="1252416" y="4509120"/>
-            <a:ext cx="1951432" cy="646331"/>
+            <a:ext cx="2035750" cy="646331"/>
           </a:xfrm>
           <a:prstGeom prst="rect">
             <a:avLst/>
@@ -4423,8 +4428,13 @@
           <a:p>
             <a:r>
               <a:rPr lang="de-DE" dirty="0" smtClean="0"/>
-              <a:t>End of mode</a:t>
-            </a:r>
+              <a:t>End of </a:t>
+            </a:r>
+            <a:r>
+              <a:rPr lang="de-DE" dirty="0" smtClean="0"/>
+              <a:t>mode / EOM</a:t>
+            </a:r>
+            <a:endParaRPr lang="de-DE" dirty="0" smtClean="0"/>
           </a:p>
           <a:p>
             <a:r>
@@ -4508,15 +4518,13 @@
       <p:cxnSp>
         <p:nvCxnSpPr>
           <p:cNvPr id="176" name="Straight Arrow Connector 175"/>
-          <p:cNvCxnSpPr>
-            <a:endCxn id="5" idx="7"/>
-          </p:cNvCxnSpPr>
+          <p:cNvCxnSpPr/>
           <p:nvPr/>
         </p:nvCxnSpPr>
         <p:spPr>
-          <a:xfrm flipH="1">
-            <a:off x="1159549" y="1340768"/>
-            <a:ext cx="1396227" cy="1798554"/>
+          <a:xfrm>
+            <a:off x="2859309" y="1340768"/>
+            <a:ext cx="632571" cy="648072"/>
           </a:xfrm>
           <a:prstGeom prst="straightConnector1">
             <a:avLst/>
@@ -4549,8 +4557,8 @@
         </p:nvSpPr>
         <p:spPr>
           <a:xfrm>
-            <a:off x="1667806" y="1107387"/>
-            <a:ext cx="640945" cy="646331"/>
+            <a:off x="1907880" y="1340768"/>
+            <a:ext cx="1439984" cy="369332"/>
           </a:xfrm>
           <a:prstGeom prst="rect">
             <a:avLst/>
@@ -4558,20 +4566,22 @@
           <a:noFill/>
         </p:spPr>
         <p:txBody>
-          <a:bodyPr wrap="none" rtlCol="0">
+          <a:bodyPr wrap="square" rtlCol="0">
             <a:spAutoFit/>
           </a:bodyPr>
           <a:lstStyle/>
           <a:p>
             <a:r>
               <a:rPr lang="de-DE" dirty="0" smtClean="0"/>
-              <a:t>&amp;FF, </a:t>
-            </a:r>
-          </a:p>
-          <a:p>
+              <a:t>&amp;FF</a:t>
+            </a:r>
             <a:r>
               <a:rPr lang="de-DE" dirty="0" smtClean="0"/>
-              <a:t>&amp;14</a:t>
+              <a:t>, &amp;</a:t>
+            </a:r>
+            <a:r>
+              <a:rPr lang="de-DE" dirty="0" smtClean="0"/>
+              <a:t>14</a:t>
             </a:r>
             <a:endParaRPr lang="en-US" dirty="0"/>
           </a:p>
@@ -4619,7 +4629,7 @@
         </p:nvSpPr>
         <p:spPr>
           <a:xfrm>
-            <a:off x="2101129" y="2193584"/>
+            <a:off x="1691680" y="2483604"/>
             <a:ext cx="553357" cy="369332"/>
           </a:xfrm>
           <a:prstGeom prst="rect">
@@ -4712,7 +4722,15 @@
           <a:p>
             <a:r>
               <a:rPr lang="de-DE" sz="1400" b="1" dirty="0" smtClean="0"/>
-              <a:t>Serial Date OR</a:t>
+              <a:t>Serial </a:t>
+            </a:r>
+            <a:r>
+              <a:rPr lang="de-DE" sz="1400" b="1" dirty="0" smtClean="0"/>
+              <a:t>Data </a:t>
+            </a:r>
+            <a:r>
+              <a:rPr lang="de-DE" sz="1400" b="1" dirty="0" smtClean="0"/>
+              <a:t>OR</a:t>
             </a:r>
           </a:p>
           <a:p>
@@ -4813,19 +4831,39 @@
           <a:p>
             <a:r>
               <a:rPr lang="de-DE" sz="1400" b="1" dirty="0" smtClean="0"/>
-              <a:t>Address, </a:t>
-            </a:r>
-          </a:p>
-          <a:p>
+              <a:t>Address</a:t>
+            </a:r>
             <a:r>
               <a:rPr lang="de-DE" sz="1400" b="1" dirty="0" smtClean="0"/>
-              <a:t>Sample Length, </a:t>
-            </a:r>
-          </a:p>
-          <a:p>
+              <a:t>, </a:t>
+            </a:r>
+          </a:p>
+          <a:p>
+            <a:r>
+              <a:rPr lang="de-DE" sz="1400" b="1" dirty="0"/>
+              <a:t>S</a:t>
+            </a:r>
             <a:r>
               <a:rPr lang="de-DE" sz="1400" b="1" dirty="0" smtClean="0"/>
-              <a:t>Then PCM Bytes </a:t>
+              <a:t>ample </a:t>
+            </a:r>
+            <a:r>
+              <a:rPr lang="de-DE" sz="1400" b="1" dirty="0" smtClean="0"/>
+              <a:t>Length, </a:t>
+            </a:r>
+          </a:p>
+          <a:p>
+            <a:r>
+              <a:rPr lang="de-DE" sz="1400" b="1" dirty="0"/>
+              <a:t>t</a:t>
+            </a:r>
+            <a:r>
+              <a:rPr lang="de-DE" sz="1400" b="1" dirty="0" smtClean="0"/>
+              <a:t>hen </a:t>
+            </a:r>
+            <a:r>
+              <a:rPr lang="de-DE" sz="1400" b="1" dirty="0" smtClean="0"/>
+              <a:t>PCM Bytes </a:t>
             </a:r>
           </a:p>
           <a:p>
@@ -4846,7 +4884,7 @@
         <p:spPr>
           <a:xfrm>
             <a:off x="6978949" y="4797152"/>
-            <a:ext cx="2273571" cy="738664"/>
+            <a:ext cx="2254335" cy="738664"/>
           </a:xfrm>
           <a:prstGeom prst="rect">
             <a:avLst/>
@@ -4873,7 +4911,11 @@
           <a:p>
             <a:r>
               <a:rPr lang="de-DE" sz="1400" b="1" dirty="0" smtClean="0"/>
-              <a:t>Channel, Page, Pitch, Speed </a:t>
+              <a:t>Channel</a:t>
+            </a:r>
+            <a:r>
+              <a:rPr lang="de-DE" sz="1400" b="1" dirty="0" smtClean="0"/>
+              <a:t>, Page, Pitch, Speed </a:t>
             </a:r>
           </a:p>
         </p:txBody>
@@ -4887,7 +4929,7 @@
         <p:spPr>
           <a:xfrm>
             <a:off x="7068003" y="222907"/>
-            <a:ext cx="2011897" cy="523220"/>
+            <a:ext cx="2021515" cy="523220"/>
           </a:xfrm>
           <a:prstGeom prst="rect">
             <a:avLst/>
@@ -4902,8 +4944,13 @@
           <a:p>
             <a:r>
               <a:rPr lang="de-DE" sz="1400" b="1" dirty="0" smtClean="0"/>
-              <a:t>Streaming of PCM Bytes </a:t>
-            </a:r>
+              <a:t>Streaming of PCM </a:t>
+            </a:r>
+            <a:r>
+              <a:rPr lang="de-DE" sz="1400" b="1" dirty="0" smtClean="0"/>
+              <a:t>Bytes:</a:t>
+            </a:r>
+            <a:endParaRPr lang="de-DE" sz="1400" b="1" dirty="0" smtClean="0"/>
           </a:p>
           <a:p>
             <a:r>
@@ -4922,7 +4969,7 @@
         <p:spPr>
           <a:xfrm>
             <a:off x="7524328" y="2204864"/>
-            <a:ext cx="1715662" cy="523220"/>
+            <a:ext cx="1712456" cy="523220"/>
           </a:xfrm>
           <a:prstGeom prst="rect">
             <a:avLst/>
@@ -4937,13 +4984,29 @@
           <a:p>
             <a:r>
               <a:rPr lang="de-DE" sz="1400" b="1" dirty="0" smtClean="0"/>
-              <a:t>Bytes: hours, </a:t>
-            </a:r>
-          </a:p>
-          <a:p>
+              <a:t>Bytes: </a:t>
+            </a:r>
             <a:r>
               <a:rPr lang="de-DE" sz="1400" b="1" dirty="0" smtClean="0"/>
-              <a:t>Minutes, seconds, …</a:t>
+              <a:t>Hours</a:t>
+            </a:r>
+            <a:r>
+              <a:rPr lang="de-DE" sz="1400" b="1" dirty="0" smtClean="0"/>
+              <a:t>, </a:t>
+            </a:r>
+          </a:p>
+          <a:p>
+            <a:r>
+              <a:rPr lang="de-DE" sz="1400" b="1" dirty="0" smtClean="0"/>
+              <a:t>Minutes, </a:t>
+            </a:r>
+            <a:r>
+              <a:rPr lang="de-DE" sz="1400" b="1" dirty="0" smtClean="0"/>
+              <a:t>Seconds</a:t>
+            </a:r>
+            <a:r>
+              <a:rPr lang="de-DE" sz="1400" b="1" dirty="0" smtClean="0"/>
+              <a:t>, …</a:t>
             </a:r>
           </a:p>
         </p:txBody>
@@ -5125,6 +5188,42 @@
               <a:t>&amp;EF</a:t>
             </a:r>
             <a:endParaRPr lang="en-US" dirty="0"/>
+          </a:p>
+        </p:txBody>
+      </p:sp>
+      <p:sp>
+        <p:nvSpPr>
+          <p:cNvPr id="55" name="TextBox 54"/>
+          <p:cNvSpPr txBox="1"/>
+          <p:nvPr/>
+        </p:nvSpPr>
+        <p:spPr>
+          <a:xfrm>
+            <a:off x="1923883" y="1628800"/>
+            <a:ext cx="1351973" cy="523220"/>
+          </a:xfrm>
+          <a:prstGeom prst="rect">
+            <a:avLst/>
+          </a:prstGeom>
+          <a:noFill/>
+        </p:spPr>
+        <p:txBody>
+          <a:bodyPr wrap="none" rtlCol="0">
+            <a:spAutoFit/>
+          </a:bodyPr>
+          <a:lstStyle/>
+          <a:p>
+            <a:r>
+              <a:rPr lang="de-DE" sz="1400" b="1" dirty="0" smtClean="0"/>
+              <a:t>Return to </a:t>
+            </a:r>
+          </a:p>
+          <a:p>
+            <a:r>
+              <a:rPr lang="de-DE" sz="1400" b="1" dirty="0" smtClean="0"/>
+              <a:t>previous mode!</a:t>
+            </a:r>
+            <a:endParaRPr lang="de-DE" sz="1400" b="1" dirty="0" smtClean="0"/>
           </a:p>
         </p:txBody>
       </p:sp>

</xml_diff>

<commit_message>
README.md update automata diagrams.
</commit_message>
<xml_diff>
--- a/manuals/ls3-modes.pptx
+++ b/manuals/ls3-modes.pptx
@@ -288,7 +288,7 @@
           <a:p>
             <a:fld id="{DCA948F1-91BB-4B18-802C-61A17130F7D7}" type="datetimeFigureOut">
               <a:rPr lang="en-US" smtClean="0"/>
-              <a:t>6/28/2019</a:t>
+              <a:t>9/5/2019</a:t>
             </a:fld>
             <a:endParaRPr lang="en-US"/>
           </a:p>
@@ -458,7 +458,7 @@
           <a:p>
             <a:fld id="{DCA948F1-91BB-4B18-802C-61A17130F7D7}" type="datetimeFigureOut">
               <a:rPr lang="en-US" smtClean="0"/>
-              <a:t>6/28/2019</a:t>
+              <a:t>9/5/2019</a:t>
             </a:fld>
             <a:endParaRPr lang="en-US"/>
           </a:p>
@@ -638,7 +638,7 @@
           <a:p>
             <a:fld id="{DCA948F1-91BB-4B18-802C-61A17130F7D7}" type="datetimeFigureOut">
               <a:rPr lang="en-US" smtClean="0"/>
-              <a:t>6/28/2019</a:t>
+              <a:t>9/5/2019</a:t>
             </a:fld>
             <a:endParaRPr lang="en-US"/>
           </a:p>
@@ -808,7 +808,7 @@
           <a:p>
             <a:fld id="{DCA948F1-91BB-4B18-802C-61A17130F7D7}" type="datetimeFigureOut">
               <a:rPr lang="en-US" smtClean="0"/>
-              <a:t>6/28/2019</a:t>
+              <a:t>9/5/2019</a:t>
             </a:fld>
             <a:endParaRPr lang="en-US"/>
           </a:p>
@@ -1054,7 +1054,7 @@
           <a:p>
             <a:fld id="{DCA948F1-91BB-4B18-802C-61A17130F7D7}" type="datetimeFigureOut">
               <a:rPr lang="en-US" smtClean="0"/>
-              <a:t>6/28/2019</a:t>
+              <a:t>9/5/2019</a:t>
             </a:fld>
             <a:endParaRPr lang="en-US"/>
           </a:p>
@@ -1342,7 +1342,7 @@
           <a:p>
             <a:fld id="{DCA948F1-91BB-4B18-802C-61A17130F7D7}" type="datetimeFigureOut">
               <a:rPr lang="en-US" smtClean="0"/>
-              <a:t>6/28/2019</a:t>
+              <a:t>9/5/2019</a:t>
             </a:fld>
             <a:endParaRPr lang="en-US"/>
           </a:p>
@@ -1764,7 +1764,7 @@
           <a:p>
             <a:fld id="{DCA948F1-91BB-4B18-802C-61A17130F7D7}" type="datetimeFigureOut">
               <a:rPr lang="en-US" smtClean="0"/>
-              <a:t>6/28/2019</a:t>
+              <a:t>9/5/2019</a:t>
             </a:fld>
             <a:endParaRPr lang="en-US"/>
           </a:p>
@@ -1882,7 +1882,7 @@
           <a:p>
             <a:fld id="{DCA948F1-91BB-4B18-802C-61A17130F7D7}" type="datetimeFigureOut">
               <a:rPr lang="en-US" smtClean="0"/>
-              <a:t>6/28/2019</a:t>
+              <a:t>9/5/2019</a:t>
             </a:fld>
             <a:endParaRPr lang="en-US"/>
           </a:p>
@@ -1977,7 +1977,7 @@
           <a:p>
             <a:fld id="{DCA948F1-91BB-4B18-802C-61A17130F7D7}" type="datetimeFigureOut">
               <a:rPr lang="en-US" smtClean="0"/>
-              <a:t>6/28/2019</a:t>
+              <a:t>9/5/2019</a:t>
             </a:fld>
             <a:endParaRPr lang="en-US"/>
           </a:p>
@@ -2254,7 +2254,7 @@
           <a:p>
             <a:fld id="{DCA948F1-91BB-4B18-802C-61A17130F7D7}" type="datetimeFigureOut">
               <a:rPr lang="en-US" smtClean="0"/>
-              <a:t>6/28/2019</a:t>
+              <a:t>9/5/2019</a:t>
             </a:fld>
             <a:endParaRPr lang="en-US"/>
           </a:p>
@@ -2507,7 +2507,7 @@
           <a:p>
             <a:fld id="{DCA948F1-91BB-4B18-802C-61A17130F7D7}" type="datetimeFigureOut">
               <a:rPr lang="en-US" smtClean="0"/>
-              <a:t>6/28/2019</a:t>
+              <a:t>9/5/2019</a:t>
             </a:fld>
             <a:endParaRPr lang="en-US"/>
           </a:p>
@@ -2720,7 +2720,7 @@
           <a:p>
             <a:fld id="{DCA948F1-91BB-4B18-802C-61A17130F7D7}" type="datetimeFigureOut">
               <a:rPr lang="en-US" smtClean="0"/>
-              <a:t>6/28/2019</a:t>
+              <a:t>9/5/2019</a:t>
             </a:fld>
             <a:endParaRPr lang="en-US"/>
           </a:p>
@@ -3945,7 +3945,7 @@
         </p:nvSpPr>
         <p:spPr>
           <a:xfrm>
-            <a:off x="3353607" y="1124744"/>
+            <a:off x="3510733" y="1235060"/>
             <a:ext cx="564578" cy="369332"/>
           </a:xfrm>
           <a:prstGeom prst="rect">
@@ -4441,8 +4441,8 @@
         </p:nvCxnSpPr>
         <p:spPr>
           <a:xfrm>
-            <a:off x="843084" y="1837234"/>
-            <a:ext cx="0" cy="1119059"/>
+            <a:off x="843084" y="2222867"/>
+            <a:ext cx="0" cy="733426"/>
           </a:xfrm>
           <a:prstGeom prst="straightConnector1">
             <a:avLst/>
@@ -4475,7 +4475,7 @@
         </p:nvSpPr>
         <p:spPr>
           <a:xfrm>
-            <a:off x="154491" y="1198493"/>
+            <a:off x="154491" y="1556792"/>
             <a:ext cx="1479572" cy="646331"/>
           </a:xfrm>
           <a:prstGeom prst="rect">
@@ -4545,7 +4545,7 @@
         </p:nvSpPr>
         <p:spPr>
           <a:xfrm>
-            <a:off x="1907880" y="1340768"/>
+            <a:off x="1735610" y="1301850"/>
             <a:ext cx="1439984" cy="369332"/>
           </a:xfrm>
           <a:prstGeom prst="rect">
@@ -4686,8 +4686,8 @@
         </p:nvSpPr>
         <p:spPr>
           <a:xfrm>
-            <a:off x="3563888" y="119534"/>
-            <a:ext cx="1406154" cy="954107"/>
+            <a:off x="5364088" y="45785"/>
+            <a:ext cx="806631" cy="430887"/>
           </a:xfrm>
           <a:prstGeom prst="rect">
             <a:avLst/>
@@ -4701,35 +4701,16 @@
           <a:lstStyle/>
           <a:p>
             <a:r>
-              <a:rPr lang="de-DE" sz="1400" b="1" dirty="0" smtClean="0"/>
-              <a:t>Serial Data OR</a:t>
-            </a:r>
-          </a:p>
-          <a:p>
-            <a:r>
-              <a:rPr lang="de-DE" sz="1400" b="1" dirty="0" smtClean="0"/>
-              <a:t>Control Byte = </a:t>
-            </a:r>
-          </a:p>
-          <a:p>
-            <a:r>
-              <a:rPr lang="de-DE" sz="1400" b="1" dirty="0"/>
-              <a:t> </a:t>
-            </a:r>
-            <a:r>
-              <a:rPr lang="de-DE" sz="1400" b="1" dirty="0" smtClean="0"/>
-              <a:t>  255 + &lt;byte&gt;</a:t>
-            </a:r>
-          </a:p>
-          <a:p>
-            <a:r>
-              <a:rPr lang="de-DE" sz="1400" b="1" dirty="0"/>
-              <a:t> </a:t>
-            </a:r>
-            <a:r>
-              <a:rPr lang="de-DE" sz="1400" b="1" dirty="0" smtClean="0"/>
-              <a:t> (255 = 255 255)</a:t>
-            </a:r>
+              <a:rPr lang="de-DE" sz="1100" b="1" dirty="0" smtClean="0"/>
+              <a:t>Don‘t Care</a:t>
+            </a:r>
+          </a:p>
+          <a:p>
+            <a:r>
+              <a:rPr lang="de-DE" sz="1100" b="1" dirty="0" smtClean="0"/>
+              <a:t>Input</a:t>
+            </a:r>
+            <a:endParaRPr lang="de-DE" sz="1100" b="1" dirty="0" smtClean="0"/>
           </a:p>
         </p:txBody>
       </p:sp>
@@ -5225,11 +5206,7 @@
           <a:p>
             <a:r>
               <a:rPr lang="de-DE" sz="1400" b="1" dirty="0" smtClean="0"/>
-              <a:t>-&gt; EXIT, r</a:t>
-            </a:r>
-            <a:r>
-              <a:rPr lang="de-DE" sz="1400" b="1" dirty="0" smtClean="0"/>
-              <a:t>eturn to </a:t>
+              <a:t>-&gt; EXIT, return to </a:t>
             </a:r>
           </a:p>
           <a:p>
@@ -5237,7 +5214,484 @@
               <a:rPr lang="de-DE" sz="1400" b="1" dirty="0" smtClean="0"/>
               <a:t>    previous mode</a:t>
             </a:r>
-            <a:endParaRPr lang="de-DE" sz="1400" b="1" dirty="0" smtClean="0"/>
+          </a:p>
+        </p:txBody>
+      </p:sp>
+      <p:sp>
+        <p:nvSpPr>
+          <p:cNvPr id="58" name="Oval 57"/>
+          <p:cNvSpPr/>
+          <p:nvPr/>
+        </p:nvSpPr>
+        <p:spPr>
+          <a:xfrm>
+            <a:off x="611560" y="534754"/>
+            <a:ext cx="895097" cy="789791"/>
+          </a:xfrm>
+          <a:prstGeom prst="ellipse">
+            <a:avLst/>
+          </a:prstGeom>
+        </p:spPr>
+        <p:style>
+          <a:lnRef idx="1">
+            <a:schemeClr val="dk1"/>
+          </a:lnRef>
+          <a:fillRef idx="2">
+            <a:schemeClr val="dk1"/>
+          </a:fillRef>
+          <a:effectRef idx="1">
+            <a:schemeClr val="dk1"/>
+          </a:effectRef>
+          <a:fontRef idx="minor">
+            <a:schemeClr val="dk1"/>
+          </a:fontRef>
+        </p:style>
+        <p:txBody>
+          <a:bodyPr rtlCol="0" anchor="ctr"/>
+          <a:lstStyle/>
+          <a:p>
+            <a:pPr algn="ctr"/>
+            <a:r>
+              <a:rPr lang="de-DE" sz="1050" b="1" dirty="0" smtClean="0"/>
+              <a:t>RX / TX </a:t>
+            </a:r>
+          </a:p>
+          <a:p>
+            <a:pPr algn="ctr"/>
+            <a:r>
+              <a:rPr lang="de-DE" sz="1050" b="1" dirty="0" smtClean="0"/>
+              <a:t>IN OUT</a:t>
+            </a:r>
+          </a:p>
+          <a:p>
+            <a:pPr algn="ctr"/>
+            <a:r>
+              <a:rPr lang="de-DE" sz="800" b="1" dirty="0" smtClean="0"/>
+              <a:t>MONITOR</a:t>
+            </a:r>
+          </a:p>
+          <a:p>
+            <a:pPr algn="ctr"/>
+            <a:r>
+              <a:rPr lang="de-DE" sz="800" b="1" dirty="0" smtClean="0"/>
+              <a:t>SUB MODE</a:t>
+            </a:r>
+            <a:endParaRPr lang="en-US" sz="700" b="1" dirty="0"/>
+          </a:p>
+        </p:txBody>
+      </p:sp>
+      <p:sp>
+        <p:nvSpPr>
+          <p:cNvPr id="59" name="Oval 58"/>
+          <p:cNvSpPr/>
+          <p:nvPr/>
+        </p:nvSpPr>
+        <p:spPr>
+          <a:xfrm>
+            <a:off x="4418027" y="550976"/>
+            <a:ext cx="895097" cy="789791"/>
+          </a:xfrm>
+          <a:prstGeom prst="ellipse">
+            <a:avLst/>
+          </a:prstGeom>
+        </p:spPr>
+        <p:style>
+          <a:lnRef idx="1">
+            <a:schemeClr val="dk1"/>
+          </a:lnRef>
+          <a:fillRef idx="2">
+            <a:schemeClr val="dk1"/>
+          </a:fillRef>
+          <a:effectRef idx="1">
+            <a:schemeClr val="dk1"/>
+          </a:effectRef>
+          <a:fontRef idx="minor">
+            <a:schemeClr val="dk1"/>
+          </a:fontRef>
+        </p:style>
+        <p:txBody>
+          <a:bodyPr rtlCol="0" anchor="ctr"/>
+          <a:lstStyle/>
+          <a:p>
+            <a:pPr algn="ctr"/>
+            <a:r>
+              <a:rPr lang="de-DE" sz="1200" b="1" dirty="0" smtClean="0"/>
+              <a:t>RX </a:t>
+            </a:r>
+            <a:br>
+              <a:rPr lang="de-DE" sz="1200" b="1" dirty="0" smtClean="0"/>
+            </a:br>
+            <a:r>
+              <a:rPr lang="de-DE" sz="1200" b="1" dirty="0" smtClean="0"/>
+              <a:t>IN </a:t>
+            </a:r>
+          </a:p>
+          <a:p>
+            <a:pPr algn="ctr"/>
+            <a:r>
+              <a:rPr lang="de-DE" sz="800" b="1" dirty="0" smtClean="0"/>
+              <a:t>MONITOR</a:t>
+            </a:r>
+          </a:p>
+          <a:p>
+            <a:pPr algn="ctr"/>
+            <a:r>
+              <a:rPr lang="de-DE" sz="800" b="1" dirty="0" smtClean="0"/>
+              <a:t>SUB MODE</a:t>
+            </a:r>
+            <a:endParaRPr lang="en-US" sz="600" b="1" dirty="0"/>
+          </a:p>
+        </p:txBody>
+      </p:sp>
+      <p:cxnSp>
+        <p:nvCxnSpPr>
+          <p:cNvPr id="62" name="Straight Arrow Connector 61"/>
+          <p:cNvCxnSpPr>
+            <a:endCxn id="58" idx="6"/>
+          </p:cNvCxnSpPr>
+          <p:nvPr/>
+        </p:nvCxnSpPr>
+        <p:spPr>
+          <a:xfrm flipH="1">
+            <a:off x="1506657" y="920660"/>
+            <a:ext cx="821532" cy="8990"/>
+          </a:xfrm>
+          <a:prstGeom prst="straightConnector1">
+            <a:avLst/>
+          </a:prstGeom>
+          <a:ln w="57150">
+            <a:headEnd type="none" w="med" len="med"/>
+            <a:tailEnd type="triangle" w="med" len="med"/>
+          </a:ln>
+        </p:spPr>
+        <p:style>
+          <a:lnRef idx="3">
+            <a:schemeClr val="dk1"/>
+          </a:lnRef>
+          <a:fillRef idx="0">
+            <a:schemeClr val="dk1"/>
+          </a:fillRef>
+          <a:effectRef idx="2">
+            <a:schemeClr val="dk1"/>
+          </a:effectRef>
+          <a:fontRef idx="minor">
+            <a:schemeClr val="tx1"/>
+          </a:fontRef>
+        </p:style>
+      </p:cxnSp>
+      <p:cxnSp>
+        <p:nvCxnSpPr>
+          <p:cNvPr id="66" name="Straight Arrow Connector 65"/>
+          <p:cNvCxnSpPr>
+            <a:endCxn id="59" idx="2"/>
+          </p:cNvCxnSpPr>
+          <p:nvPr/>
+        </p:nvCxnSpPr>
+        <p:spPr>
+          <a:xfrm flipV="1">
+            <a:off x="3353607" y="945872"/>
+            <a:ext cx="1064420" cy="1"/>
+          </a:xfrm>
+          <a:prstGeom prst="straightConnector1">
+            <a:avLst/>
+          </a:prstGeom>
+          <a:ln w="57150">
+            <a:headEnd type="none" w="med" len="med"/>
+            <a:tailEnd type="triangle" w="med" len="med"/>
+          </a:ln>
+        </p:spPr>
+        <p:style>
+          <a:lnRef idx="3">
+            <a:schemeClr val="dk1"/>
+          </a:lnRef>
+          <a:fillRef idx="0">
+            <a:schemeClr val="dk1"/>
+          </a:fillRef>
+          <a:effectRef idx="2">
+            <a:schemeClr val="dk1"/>
+          </a:effectRef>
+          <a:fontRef idx="minor">
+            <a:schemeClr val="tx1"/>
+          </a:fontRef>
+        </p:style>
+      </p:cxnSp>
+      <p:cxnSp>
+        <p:nvCxnSpPr>
+          <p:cNvPr id="69" name="Curved Connector 68"/>
+          <p:cNvCxnSpPr/>
+          <p:nvPr/>
+        </p:nvCxnSpPr>
+        <p:spPr>
+          <a:xfrm rot="16200000" flipH="1">
+            <a:off x="1094287" y="444953"/>
+            <a:ext cx="394896" cy="447548"/>
+          </a:xfrm>
+          <a:prstGeom prst="curvedConnector4">
+            <a:avLst>
+              <a:gd name="adj1" fmla="val -57889"/>
+              <a:gd name="adj2" fmla="val 151078"/>
+            </a:avLst>
+          </a:prstGeom>
+          <a:ln>
+            <a:headEnd type="none" w="med" len="med"/>
+            <a:tailEnd type="triangle" w="med" len="med"/>
+          </a:ln>
+        </p:spPr>
+        <p:style>
+          <a:lnRef idx="3">
+            <a:schemeClr val="dk1"/>
+          </a:lnRef>
+          <a:fillRef idx="0">
+            <a:schemeClr val="dk1"/>
+          </a:fillRef>
+          <a:effectRef idx="2">
+            <a:schemeClr val="dk1"/>
+          </a:effectRef>
+          <a:fontRef idx="minor">
+            <a:schemeClr val="tx1"/>
+          </a:fontRef>
+        </p:style>
+      </p:cxnSp>
+      <p:sp>
+        <p:nvSpPr>
+          <p:cNvPr id="71" name="TextBox 70"/>
+          <p:cNvSpPr txBox="1"/>
+          <p:nvPr/>
+        </p:nvSpPr>
+        <p:spPr>
+          <a:xfrm>
+            <a:off x="1691680" y="20524"/>
+            <a:ext cx="1053494" cy="600164"/>
+          </a:xfrm>
+          <a:prstGeom prst="rect">
+            <a:avLst/>
+          </a:prstGeom>
+          <a:noFill/>
+        </p:spPr>
+        <p:txBody>
+          <a:bodyPr wrap="none" rtlCol="0">
+            <a:spAutoFit/>
+          </a:bodyPr>
+          <a:lstStyle/>
+          <a:p>
+            <a:r>
+              <a:rPr lang="de-DE" sz="1100" b="1" dirty="0" smtClean="0"/>
+              <a:t>Serial Data OR</a:t>
+            </a:r>
+          </a:p>
+          <a:p>
+            <a:r>
+              <a:rPr lang="de-DE" sz="1100" b="1" dirty="0" smtClean="0"/>
+              <a:t>Control Byte = </a:t>
+            </a:r>
+          </a:p>
+          <a:p>
+            <a:r>
+              <a:rPr lang="de-DE" sz="1100" b="1" dirty="0"/>
+              <a:t> </a:t>
+            </a:r>
+            <a:r>
+              <a:rPr lang="de-DE" sz="1100" b="1" dirty="0" smtClean="0"/>
+              <a:t>  255 + &lt;byte</a:t>
+            </a:r>
+            <a:r>
+              <a:rPr lang="de-DE" sz="1100" b="1" dirty="0" smtClean="0"/>
+              <a:t>&gt;</a:t>
+            </a:r>
+            <a:endParaRPr lang="de-DE" sz="1100" b="1" dirty="0" smtClean="0"/>
+          </a:p>
+        </p:txBody>
+      </p:sp>
+      <p:cxnSp>
+        <p:nvCxnSpPr>
+          <p:cNvPr id="72" name="Straight Arrow Connector 71"/>
+          <p:cNvCxnSpPr/>
+          <p:nvPr/>
+        </p:nvCxnSpPr>
+        <p:spPr>
+          <a:xfrm>
+            <a:off x="1515509" y="1082854"/>
+            <a:ext cx="812680" cy="0"/>
+          </a:xfrm>
+          <a:prstGeom prst="straightConnector1">
+            <a:avLst/>
+          </a:prstGeom>
+          <a:ln w="57150">
+            <a:headEnd type="none" w="med" len="med"/>
+            <a:tailEnd type="triangle" w="med" len="med"/>
+          </a:ln>
+        </p:spPr>
+        <p:style>
+          <a:lnRef idx="3">
+            <a:schemeClr val="dk1"/>
+          </a:lnRef>
+          <a:fillRef idx="0">
+            <a:schemeClr val="dk1"/>
+          </a:fillRef>
+          <a:effectRef idx="2">
+            <a:schemeClr val="dk1"/>
+          </a:effectRef>
+          <a:fontRef idx="minor">
+            <a:schemeClr val="tx1"/>
+          </a:fontRef>
+        </p:style>
+      </p:cxnSp>
+      <p:cxnSp>
+        <p:nvCxnSpPr>
+          <p:cNvPr id="77" name="Curved Connector 76"/>
+          <p:cNvCxnSpPr/>
+          <p:nvPr/>
+        </p:nvCxnSpPr>
+        <p:spPr>
+          <a:xfrm rot="16200000" flipH="1">
+            <a:off x="4883821" y="524651"/>
+            <a:ext cx="394896" cy="447548"/>
+          </a:xfrm>
+          <a:prstGeom prst="curvedConnector4">
+            <a:avLst>
+              <a:gd name="adj1" fmla="val -57889"/>
+              <a:gd name="adj2" fmla="val 151078"/>
+            </a:avLst>
+          </a:prstGeom>
+          <a:ln>
+            <a:headEnd type="none" w="med" len="med"/>
+            <a:tailEnd type="triangle" w="med" len="med"/>
+          </a:ln>
+        </p:spPr>
+        <p:style>
+          <a:lnRef idx="3">
+            <a:schemeClr val="dk1"/>
+          </a:lnRef>
+          <a:fillRef idx="0">
+            <a:schemeClr val="dk1"/>
+          </a:fillRef>
+          <a:effectRef idx="2">
+            <a:schemeClr val="dk1"/>
+          </a:effectRef>
+          <a:fontRef idx="minor">
+            <a:schemeClr val="tx1"/>
+          </a:fontRef>
+        </p:style>
+      </p:cxnSp>
+      <p:sp>
+        <p:nvSpPr>
+          <p:cNvPr id="78" name="TextBox 77"/>
+          <p:cNvSpPr txBox="1"/>
+          <p:nvPr/>
+        </p:nvSpPr>
+        <p:spPr>
+          <a:xfrm>
+            <a:off x="3374490" y="44624"/>
+            <a:ext cx="1053494" cy="600164"/>
+          </a:xfrm>
+          <a:prstGeom prst="rect">
+            <a:avLst/>
+          </a:prstGeom>
+          <a:noFill/>
+        </p:spPr>
+        <p:txBody>
+          <a:bodyPr wrap="none" rtlCol="0">
+            <a:spAutoFit/>
+          </a:bodyPr>
+          <a:lstStyle/>
+          <a:p>
+            <a:r>
+              <a:rPr lang="de-DE" sz="1100" b="1" dirty="0" smtClean="0"/>
+              <a:t>Serial Data OR</a:t>
+            </a:r>
+          </a:p>
+          <a:p>
+            <a:r>
+              <a:rPr lang="de-DE" sz="1100" b="1" dirty="0" smtClean="0"/>
+              <a:t>Control Byte = </a:t>
+            </a:r>
+          </a:p>
+          <a:p>
+            <a:r>
+              <a:rPr lang="de-DE" sz="1100" b="1" dirty="0"/>
+              <a:t> </a:t>
+            </a:r>
+            <a:r>
+              <a:rPr lang="de-DE" sz="1100" b="1" dirty="0" smtClean="0"/>
+              <a:t>  255 + &lt;byte</a:t>
+            </a:r>
+            <a:r>
+              <a:rPr lang="de-DE" sz="1100" b="1" dirty="0" smtClean="0"/>
+              <a:t>&gt;</a:t>
+            </a:r>
+            <a:endParaRPr lang="de-DE" sz="1100" b="1" dirty="0" smtClean="0"/>
+          </a:p>
+        </p:txBody>
+      </p:sp>
+      <p:sp>
+        <p:nvSpPr>
+          <p:cNvPr id="79" name="TextBox 78"/>
+          <p:cNvSpPr txBox="1"/>
+          <p:nvPr/>
+        </p:nvSpPr>
+        <p:spPr>
+          <a:xfrm>
+            <a:off x="3492056" y="960983"/>
+            <a:ext cx="1439984" cy="307777"/>
+          </a:xfrm>
+          <a:prstGeom prst="rect">
+            <a:avLst/>
+          </a:prstGeom>
+          <a:noFill/>
+        </p:spPr>
+        <p:txBody>
+          <a:bodyPr wrap="square" rtlCol="0">
+            <a:spAutoFit/>
+          </a:bodyPr>
+          <a:lstStyle/>
+          <a:p>
+            <a:r>
+              <a:rPr lang="de-DE" sz="1400" dirty="0" smtClean="0"/>
+              <a:t>&amp;FF, </a:t>
+            </a:r>
+            <a:r>
+              <a:rPr lang="de-DE" sz="1400" dirty="0" smtClean="0"/>
+              <a:t>10</a:t>
+            </a:r>
+            <a:endParaRPr lang="en-US" sz="1400" dirty="0"/>
+          </a:p>
+        </p:txBody>
+      </p:sp>
+      <p:sp>
+        <p:nvSpPr>
+          <p:cNvPr id="80" name="TextBox 79"/>
+          <p:cNvSpPr txBox="1"/>
+          <p:nvPr/>
+        </p:nvSpPr>
+        <p:spPr>
+          <a:xfrm>
+            <a:off x="1691680" y="600943"/>
+            <a:ext cx="1439984" cy="307777"/>
+          </a:xfrm>
+          <a:prstGeom prst="rect">
+            <a:avLst/>
+          </a:prstGeom>
+          <a:noFill/>
+        </p:spPr>
+        <p:txBody>
+          <a:bodyPr wrap="square" rtlCol="0">
+            <a:spAutoFit/>
+          </a:bodyPr>
+          <a:lstStyle/>
+          <a:p>
+            <a:r>
+              <a:rPr lang="de-DE" sz="1400" dirty="0" smtClean="0"/>
+              <a:t>&amp;FF, </a:t>
+            </a:r>
+            <a:r>
+              <a:rPr lang="de-DE" sz="1400" dirty="0"/>
+              <a:t>5</a:t>
+            </a:r>
+            <a:r>
+              <a:rPr lang="de-DE" sz="1400" dirty="0" smtClean="0"/>
+              <a:t>0</a:t>
+            </a:r>
+            <a:endParaRPr lang="en-US" sz="1400" dirty="0"/>
           </a:p>
         </p:txBody>
       </p:sp>

</xml_diff>